<commit_message>
heatmap matrice di correlazione
</commit_message>
<xml_diff>
--- a/LN.pptx
+++ b/LN.pptx
@@ -40,7 +40,6 @@
     <p:sldId id="286" r:id="rId34"/>
     <p:sldId id="287" r:id="rId35"/>
     <p:sldId id="291" r:id="rId36"/>
-    <p:sldId id="292" r:id="rId37"/>
   </p:sldIdLst>
   <p:sldSz cx="12192000" cy="6858000"/>
   <p:notesSz cx="6858000" cy="9144000"/>
@@ -3418,15 +3417,45 @@
         </p:nvSpPr>
         <p:spPr>
           <a:xfrm>
-            <a:off x="349928" y="1013950"/>
-            <a:ext cx="11705948" cy="5582159"/>
+            <a:off x="216763" y="790114"/>
+            <a:ext cx="11705948" cy="5726096"/>
           </a:xfrm>
         </p:spPr>
         <p:txBody>
           <a:bodyPr>
-            <a:normAutofit/>
+            <a:normAutofit lnSpcReduction="10000"/>
           </a:bodyPr>
           <a:lstStyle/>
+          <a:p>
+            <a:pPr>
+              <a:buFont typeface="Wingdings" panose="05000000000000000000" pitchFamily="2" charset="2"/>
+              <a:buChar char="§"/>
+            </a:pPr>
+            <a:r>
+              <a:rPr lang="it-IT" sz="2500" dirty="0"/>
+              <a:t>Studio del dataset: suddivisione in due files distinti </a:t>
+            </a:r>
+            <a:r>
+              <a:rPr lang="it-IT" sz="2500" i="1" dirty="0" err="1"/>
+              <a:t>channels</a:t>
+            </a:r>
+            <a:r>
+              <a:rPr lang="it-IT" sz="2500" dirty="0"/>
+              <a:t> e </a:t>
+            </a:r>
+            <a:r>
+              <a:rPr lang="it-IT" sz="2500" i="1" dirty="0" err="1"/>
+              <a:t>nodes</a:t>
+            </a:r>
+            <a:r>
+              <a:rPr lang="it-IT" sz="2500" i="1" dirty="0"/>
+              <a:t>, </a:t>
+            </a:r>
+            <a:r>
+              <a:rPr lang="it-IT" sz="2500" dirty="0"/>
+              <a:t>utilizzati per la costruzione del grafo, filtrando i campi non utili ai fini delle analisi</a:t>
+            </a:r>
+          </a:p>
           <a:p>
             <a:pPr>
               <a:buFont typeface="Wingdings" panose="05000000000000000000" pitchFamily="2" charset="2"/>
@@ -3566,7 +3595,7 @@
             <a:pPr lvl="1"/>
             <a:r>
               <a:rPr lang="it-IT" sz="2500" dirty="0"/>
-              <a:t>ricerca dei nodi aggregatori</a:t>
+              <a:t>algoritmo per la ricerca dei nodi aggregatori</a:t>
             </a:r>
           </a:p>
           <a:p>
@@ -3613,11 +3642,11 @@
             </a:r>
             <a:r>
               <a:rPr lang="it-IT" sz="2500" i="1" dirty="0"/>
-              <a:t> </a:t>
+              <a:t> (</a:t>
             </a:r>
             <a:r>
               <a:rPr lang="it-IT" sz="2500" dirty="0"/>
-              <a:t>considerando solo i canali uscenti dai nodi aggregatori</a:t>
+              <a:t>considerando solo i canali uscenti dai nodi aggregatori)</a:t>
             </a:r>
           </a:p>
           <a:p>
@@ -6310,7 +6339,7 @@
         </p:spPr>
         <p:txBody>
           <a:bodyPr>
-            <a:normAutofit lnSpcReduction="10000"/>
+            <a:normAutofit fontScale="92500" lnSpcReduction="10000"/>
           </a:bodyPr>
           <a:lstStyle/>
           <a:p>
@@ -6330,6 +6359,7 @@
               <a:rPr lang="it-IT" sz="2500" dirty="0"/>
               <a:t> in grafo con eliminazione multielementi (per l’analisi di centralità)</a:t>
             </a:r>
+            <a:endParaRPr lang="it-IT" sz="2500" i="1" dirty="0"/>
           </a:p>
           <a:p>
             <a:pPr>
@@ -6338,7 +6368,7 @@
             </a:pPr>
             <a:r>
               <a:rPr lang="it-IT" sz="2500" i="1" dirty="0"/>
-              <a:t>Ricerca di </a:t>
+              <a:t>Analisi di </a:t>
             </a:r>
             <a:r>
               <a:rPr lang="it-IT" sz="2500" i="1" dirty="0">
@@ -6350,30 +6380,69 @@
                   </a:outerShdw>
                 </a:effectLst>
               </a:rPr>
-              <a:t>correlazioni</a:t>
+              <a:t>Centralità</a:t>
+            </a:r>
+            <a:r>
+              <a:rPr lang="it-IT" sz="2500" dirty="0"/>
+              <a:t>: </a:t>
+            </a:r>
+          </a:p>
+          <a:p>
+            <a:pPr lvl="1"/>
+            <a:r>
+              <a:rPr lang="it-IT" sz="2500" dirty="0"/>
+              <a:t>calcolo di </a:t>
+            </a:r>
+            <a:r>
+              <a:rPr lang="it-IT" sz="2500" i="1" dirty="0" err="1"/>
+              <a:t>betweenness</a:t>
+            </a:r>
+            <a:r>
+              <a:rPr lang="it-IT" sz="2500" dirty="0"/>
+              <a:t>, </a:t>
+            </a:r>
+            <a:r>
+              <a:rPr lang="it-IT" sz="2500" i="1" dirty="0" err="1"/>
+              <a:t>closeness</a:t>
+            </a:r>
+            <a:r>
+              <a:rPr lang="it-IT" sz="2500" dirty="0"/>
+              <a:t>, </a:t>
             </a:r>
             <a:r>
               <a:rPr lang="it-IT" sz="2500" i="1" dirty="0"/>
-              <a:t>:</a:t>
+              <a:t>degree</a:t>
+            </a:r>
+            <a:r>
+              <a:rPr lang="it-IT" sz="2500" dirty="0"/>
+              <a:t> e </a:t>
+            </a:r>
+            <a:r>
+              <a:rPr lang="it-IT" sz="2500" i="1" dirty="0" err="1"/>
+              <a:t>eigenvector</a:t>
+            </a:r>
+            <a:r>
+              <a:rPr lang="it-IT" sz="2500" i="1" dirty="0"/>
+              <a:t> </a:t>
+            </a:r>
+            <a:r>
+              <a:rPr lang="it-IT" sz="2500" i="1" dirty="0" err="1"/>
+              <a:t>centrality</a:t>
+            </a:r>
+            <a:r>
+              <a:rPr lang="it-IT" sz="2500" i="1" dirty="0"/>
+              <a:t>,</a:t>
+            </a:r>
+            <a:r>
+              <a:rPr lang="it-IT" sz="2500" dirty="0"/>
+              <a:t> e distribuzione dei valori di centralità in base al grado del nodo</a:t>
             </a:r>
           </a:p>
           <a:p>
             <a:pPr lvl="1"/>
             <a:r>
-              <a:rPr lang="it-IT" sz="2500" i="1" dirty="0"/>
-              <a:t>studio delle </a:t>
-            </a:r>
-            <a:r>
-              <a:rPr lang="it-IT" sz="2500" i="1" dirty="0" err="1"/>
-              <a:t>fee</a:t>
-            </a:r>
-            <a:r>
-              <a:rPr lang="it-IT" sz="2500" i="1" dirty="0"/>
-              <a:t> applicate dai nodi più centrali ai propri vicini</a:t>
-            </a:r>
-            <a:r>
               <a:rPr lang="it-IT" sz="2500" dirty="0"/>
-              <a:t>: ricerca di una correlazione tra il valore delle </a:t>
+              <a:t>individuazione dei nodi più centrali e studio delle </a:t>
             </a:r>
             <a:r>
               <a:rPr lang="it-IT" sz="2500" dirty="0" err="1"/>
@@ -6381,49 +6450,15 @@
             </a:r>
             <a:r>
               <a:rPr lang="it-IT" sz="2500" dirty="0"/>
-              <a:t> applicate e la centralità dei nodi vicini</a:t>
-            </a:r>
-          </a:p>
-          <a:p>
-            <a:pPr lvl="1"/>
-            <a:r>
-              <a:rPr lang="it-IT" sz="2500" i="1" dirty="0"/>
-              <a:t>studio delle </a:t>
+              <a:t> applicate dai 10 nodi più centrali sui propri canali: calcolo delle distribuzioni dei valori di </a:t>
             </a:r>
             <a:r>
               <a:rPr lang="it-IT" sz="2500" i="1" dirty="0" err="1"/>
-              <a:t>fee</a:t>
-            </a:r>
-            <a:r>
-              <a:rPr lang="it-IT" sz="2500" i="1" dirty="0"/>
-              <a:t> applicate dai nodi più centrali sui propri canali: </a:t>
+              <a:t>min_htlc</a:t>
             </a:r>
             <a:r>
               <a:rPr lang="it-IT" sz="2500" dirty="0"/>
-              <a:t>ricerca di una correlazione tra i valori delle </a:t>
-            </a:r>
-            <a:r>
-              <a:rPr lang="it-IT" sz="2500" dirty="0" err="1"/>
-              <a:t>fee</a:t>
-            </a:r>
-            <a:r>
-              <a:rPr lang="it-IT" sz="2500" dirty="0"/>
-              <a:t> e la capacità del canale su cui vengono applicate</a:t>
-            </a:r>
-          </a:p>
-          <a:p>
-            <a:pPr lvl="1"/>
-            <a:r>
-              <a:rPr lang="it-IT" sz="2500" i="1" dirty="0"/>
-              <a:t>Matrice di correlazione </a:t>
-            </a:r>
-            <a:r>
-              <a:rPr lang="it-IT" sz="2500" dirty="0"/>
-              <a:t>per individuare eventuali correlazioni tra tutte le possibili coppie di valori (</a:t>
-            </a:r>
-            <a:r>
-              <a:rPr lang="it-IT" sz="2500" i="1" dirty="0"/>
-              <a:t>ad esempio: valori di </a:t>
+              <a:t>, </a:t>
             </a:r>
             <a:r>
               <a:rPr lang="it-IT" sz="2500" i="1" dirty="0" err="1"/>
@@ -6431,7 +6466,11 @@
             </a:r>
             <a:r>
               <a:rPr lang="it-IT" sz="2500" i="1" dirty="0"/>
-              <a:t> e valori di </a:t>
+              <a:t> </a:t>
+            </a:r>
+            <a:r>
+              <a:rPr lang="it-IT" sz="2500" dirty="0"/>
+              <a:t>e </a:t>
             </a:r>
             <a:r>
               <a:rPr lang="it-IT" sz="2500" i="1" dirty="0" err="1"/>
@@ -6439,33 +6478,12 @@
             </a:r>
             <a:r>
               <a:rPr lang="it-IT" sz="2500" i="1" dirty="0"/>
-              <a:t>, valori di </a:t>
-            </a:r>
-            <a:r>
-              <a:rPr lang="it-IT" sz="2500" i="1" dirty="0" err="1"/>
-              <a:t>min_htlc</a:t>
-            </a:r>
-            <a:r>
-              <a:rPr lang="it-IT" sz="2500" i="1" dirty="0"/>
-              <a:t> e </a:t>
-            </a:r>
-            <a:r>
-              <a:rPr lang="it-IT" sz="2500" i="1" dirty="0" err="1"/>
-              <a:t>capacity_channel</a:t>
-            </a:r>
-            <a:r>
-              <a:rPr lang="it-IT" sz="2500" i="1" dirty="0"/>
-              <a:t>..</a:t>
+              <a:t> </a:t>
             </a:r>
             <a:r>
               <a:rPr lang="it-IT" sz="2500" dirty="0"/>
-              <a:t>)</a:t>
-            </a:r>
-            <a:endParaRPr lang="it-IT" sz="2500" i="1" dirty="0"/>
-          </a:p>
-          <a:p>
-            <a:pPr lvl="1"/>
-            <a:endParaRPr lang="it-IT" sz="2500" i="1" dirty="0"/>
+              <a:t>considerando solo i canali uscenti da essi</a:t>
+            </a:r>
           </a:p>
           <a:p>
             <a:pPr>
@@ -6474,7 +6492,7 @@
             </a:pPr>
             <a:r>
               <a:rPr lang="it-IT" sz="2500" i="1" dirty="0"/>
-              <a:t>Analisi di </a:t>
+              <a:t>Ricerca di </a:t>
             </a:r>
             <a:r>
               <a:rPr lang="it-IT" sz="2500" i="1" dirty="0">
@@ -6486,69 +6504,30 @@
                   </a:outerShdw>
                 </a:effectLst>
               </a:rPr>
-              <a:t>Centralità</a:t>
+              <a:t>correlazioni</a:t>
+            </a:r>
+            <a:r>
+              <a:rPr lang="it-IT" sz="2500" i="1" dirty="0"/>
+              <a:t>:</a:t>
+            </a:r>
+          </a:p>
+          <a:p>
+            <a:pPr lvl="1"/>
+            <a:r>
+              <a:rPr lang="it-IT" sz="2500" i="1" dirty="0"/>
+              <a:t>studio delle </a:t>
+            </a:r>
+            <a:r>
+              <a:rPr lang="it-IT" sz="2500" i="1" dirty="0" err="1"/>
+              <a:t>fee</a:t>
+            </a:r>
+            <a:r>
+              <a:rPr lang="it-IT" sz="2500" i="1" dirty="0"/>
+              <a:t> applicate dai nodi più centrali ai propri vicini</a:t>
             </a:r>
             <a:r>
               <a:rPr lang="it-IT" sz="2500" dirty="0"/>
-              <a:t>: </a:t>
-            </a:r>
-          </a:p>
-          <a:p>
-            <a:pPr lvl="1"/>
-            <a:r>
-              <a:rPr lang="it-IT" sz="2500" dirty="0"/>
-              <a:t>calcolo di </a:t>
-            </a:r>
-            <a:r>
-              <a:rPr lang="it-IT" sz="2500" i="1" dirty="0" err="1"/>
-              <a:t>betweenness</a:t>
-            </a:r>
-            <a:r>
-              <a:rPr lang="it-IT" sz="2500" dirty="0"/>
-              <a:t>, </a:t>
-            </a:r>
-            <a:r>
-              <a:rPr lang="it-IT" sz="2500" i="1" dirty="0" err="1"/>
-              <a:t>closeness</a:t>
-            </a:r>
-            <a:r>
-              <a:rPr lang="it-IT" sz="2500" dirty="0"/>
-              <a:t>, </a:t>
-            </a:r>
-            <a:r>
-              <a:rPr lang="it-IT" sz="2500" i="1" dirty="0"/>
-              <a:t>degree</a:t>
-            </a:r>
-            <a:r>
-              <a:rPr lang="it-IT" sz="2500" dirty="0"/>
-              <a:t> e </a:t>
-            </a:r>
-            <a:r>
-              <a:rPr lang="it-IT" sz="2500" i="1" dirty="0" err="1"/>
-              <a:t>eigenvector</a:t>
-            </a:r>
-            <a:r>
-              <a:rPr lang="it-IT" sz="2500" i="1" dirty="0"/>
-              <a:t> </a:t>
-            </a:r>
-            <a:r>
-              <a:rPr lang="it-IT" sz="2500" i="1" dirty="0" err="1"/>
-              <a:t>centrality</a:t>
-            </a:r>
-            <a:r>
-              <a:rPr lang="it-IT" sz="2500" i="1" dirty="0"/>
-              <a:t>,</a:t>
-            </a:r>
-            <a:r>
-              <a:rPr lang="it-IT" sz="2500" dirty="0"/>
-              <a:t>  e distribuzione dei valori di centralità in base al grado del nodo</a:t>
-            </a:r>
-          </a:p>
-          <a:p>
-            <a:pPr lvl="1"/>
-            <a:r>
-              <a:rPr lang="it-IT" sz="2500" dirty="0"/>
-              <a:t>individuazione dei nodi più centrali e studio delle </a:t>
+              <a:t>: ricerca di una correlazione tra il valore delle </a:t>
             </a:r>
             <a:r>
               <a:rPr lang="it-IT" sz="2500" dirty="0" err="1"/>
@@ -6556,40 +6535,112 @@
             </a:r>
             <a:r>
               <a:rPr lang="it-IT" sz="2500" dirty="0"/>
-              <a:t> applicate dai 10 nodi più centrali sui propri canali: calcolo delle distribuzioni dei valori di </a:t>
+              <a:t> applicate e la centralità dei nodi vicini</a:t>
+            </a:r>
+          </a:p>
+          <a:p>
+            <a:pPr lvl="1"/>
+            <a:r>
+              <a:rPr lang="it-IT" sz="2500" i="1" dirty="0"/>
+              <a:t>studio delle </a:t>
+            </a:r>
+            <a:r>
+              <a:rPr lang="it-IT" sz="2500" i="1" dirty="0" err="1"/>
+              <a:t>fee</a:t>
+            </a:r>
+            <a:r>
+              <a:rPr lang="it-IT" sz="2500" i="1" dirty="0"/>
+              <a:t> applicate dai nodi più centrali sui propri canali: </a:t>
+            </a:r>
+            <a:r>
+              <a:rPr lang="it-IT" sz="2500" dirty="0"/>
+              <a:t>ricerca di una correlazione tra i valori delle </a:t>
+            </a:r>
+            <a:r>
+              <a:rPr lang="it-IT" sz="2500" dirty="0" err="1"/>
+              <a:t>fee</a:t>
+            </a:r>
+            <a:r>
+              <a:rPr lang="it-IT" sz="2500" dirty="0"/>
+              <a:t> e la capacità del canale su cui vengono applicate</a:t>
+            </a:r>
+          </a:p>
+          <a:p>
+            <a:pPr marL="457200" lvl="1" indent="0">
+              <a:buNone/>
+            </a:pPr>
+            <a:r>
+              <a:rPr lang="it-IT" sz="1700" i="1" dirty="0"/>
+              <a:t>(per i due studi precedenti ho usato i nodi più centrali secondo la </a:t>
+            </a:r>
+            <a:r>
+              <a:rPr lang="it-IT" sz="1700" i="1" dirty="0" err="1"/>
+              <a:t>closeness</a:t>
+            </a:r>
+            <a:r>
+              <a:rPr lang="it-IT" sz="1700" i="1" dirty="0"/>
+              <a:t> </a:t>
+            </a:r>
+            <a:r>
+              <a:rPr lang="it-IT" sz="1700" i="1" dirty="0" err="1"/>
+              <a:t>centrality</a:t>
+            </a:r>
+            <a:r>
+              <a:rPr lang="it-IT" sz="1700" i="1" dirty="0"/>
+              <a:t>- poiché la distribuzione era l’unica ad avere un andamento che si discostava da quello delle altre tre centralità)</a:t>
+            </a:r>
+          </a:p>
+          <a:p>
+            <a:pPr lvl="1"/>
+            <a:r>
+              <a:rPr lang="it-IT" sz="2500" i="1" dirty="0"/>
+              <a:t>Matrice di correlazione </a:t>
+            </a:r>
+            <a:r>
+              <a:rPr lang="it-IT" sz="2500" dirty="0"/>
+              <a:t>per individuare eventuali correlazioni tra tutte le possibili coppie di valori (</a:t>
+            </a:r>
+            <a:r>
+              <a:rPr lang="it-IT" sz="2500" i="1" dirty="0"/>
+              <a:t>ad esempio: valori di </a:t>
+            </a:r>
+            <a:r>
+              <a:rPr lang="it-IT" sz="2500" i="1" dirty="0" err="1"/>
+              <a:t>fee_base</a:t>
+            </a:r>
+            <a:r>
+              <a:rPr lang="it-IT" sz="2500" i="1" dirty="0"/>
+              <a:t> e valori di </a:t>
+            </a:r>
+            <a:r>
+              <a:rPr lang="it-IT" sz="2500" i="1" dirty="0" err="1"/>
+              <a:t>fee_rate</a:t>
+            </a:r>
+            <a:r>
+              <a:rPr lang="it-IT" sz="2500" i="1" dirty="0"/>
+              <a:t>, valori di </a:t>
             </a:r>
             <a:r>
               <a:rPr lang="it-IT" sz="2500" i="1" dirty="0" err="1"/>
               <a:t>min_htlc</a:t>
             </a:r>
             <a:r>
+              <a:rPr lang="it-IT" sz="2500" i="1" dirty="0"/>
+              <a:t> e </a:t>
+            </a:r>
+            <a:r>
+              <a:rPr lang="it-IT" sz="2500" i="1" dirty="0" err="1"/>
+              <a:t>capacity_channel</a:t>
+            </a:r>
+            <a:r>
+              <a:rPr lang="it-IT" sz="2500" i="1" dirty="0"/>
+              <a:t>..</a:t>
+            </a:r>
+            <a:r>
               <a:rPr lang="it-IT" sz="2500" dirty="0"/>
-              <a:t>, </a:t>
-            </a:r>
-            <a:r>
-              <a:rPr lang="it-IT" sz="2500" i="1" dirty="0" err="1"/>
-              <a:t>fee_base</a:t>
-            </a:r>
-            <a:r>
-              <a:rPr lang="it-IT" sz="2500" i="1" dirty="0"/>
-              <a:t> </a:t>
-            </a:r>
-            <a:r>
-              <a:rPr lang="it-IT" sz="2500" dirty="0"/>
-              <a:t>e </a:t>
-            </a:r>
-            <a:r>
-              <a:rPr lang="it-IT" sz="2500" i="1" dirty="0" err="1"/>
-              <a:t>fee_rate</a:t>
-            </a:r>
-            <a:r>
-              <a:rPr lang="it-IT" sz="2500" i="1" dirty="0"/>
-              <a:t> </a:t>
-            </a:r>
-            <a:r>
-              <a:rPr lang="it-IT" sz="2500" dirty="0"/>
-              <a:t>considerando solo i canali uscenti da essi</a:t>
-            </a:r>
+              <a:t>)</a:t>
+            </a:r>
+            <a:endParaRPr lang="it-IT" sz="2500" i="1" dirty="0"/>
           </a:p>
           <a:p>
             <a:pPr marL="457200" lvl="1" indent="0">
@@ -9693,7 +9744,7 @@
         </p:nvSpPr>
         <p:spPr>
           <a:xfrm>
-            <a:off x="838199" y="794333"/>
+            <a:off x="257174" y="18255"/>
             <a:ext cx="10515600" cy="1325563"/>
           </a:xfrm>
         </p:spPr>
@@ -9717,10 +9768,10 @@
       </p:sp>
       <p:pic>
         <p:nvPicPr>
-          <p:cNvPr id="4" name="Segnaposto contenuto 3">
-            <a:extLst>
-              <a:ext uri="{FF2B5EF4-FFF2-40B4-BE49-F238E27FC236}">
-                <a16:creationId xmlns:a16="http://schemas.microsoft.com/office/drawing/2014/main" id="{CDA94C53-0B65-42C2-9620-03BE4BDA6DE2}"/>
+          <p:cNvPr id="7" name="Segnaposto contenuto 6" descr="Immagine che contiene tavolo&#10;&#10;Descrizione generata automaticamente">
+            <a:extLst>
+              <a:ext uri="{FF2B5EF4-FFF2-40B4-BE49-F238E27FC236}">
+                <a16:creationId xmlns:a16="http://schemas.microsoft.com/office/drawing/2014/main" id="{AA39FEFF-7EEA-4D7B-834D-A7C07001D72D}"/>
               </a:ext>
             </a:extLst>
           </p:cNvPr>
@@ -9732,19 +9783,22 @@
           </p:nvPr>
         </p:nvPicPr>
         <p:blipFill>
-          <a:blip r:embed="rId2"/>
+          <a:blip r:embed="rId2">
+            <a:extLst>
+              <a:ext uri="{28A0092B-C50C-407E-A947-70E740481C1C}">
+                <a14:useLocalDpi xmlns:a14="http://schemas.microsoft.com/office/drawing/2010/main" val="0"/>
+              </a:ext>
+            </a:extLst>
+          </a:blip>
           <a:stretch>
             <a:fillRect/>
           </a:stretch>
         </p:blipFill>
         <p:spPr>
           <a:xfrm>
-            <a:off x="1464747" y="2204462"/>
-            <a:ext cx="9262503" cy="2777494"/>
+            <a:off x="1835348" y="827087"/>
+            <a:ext cx="8521304" cy="5680869"/>
           </a:xfrm>
-          <a:prstGeom prst="rect">
-            <a:avLst/>
-          </a:prstGeom>
         </p:spPr>
       </p:pic>
     </p:spTree>
@@ -9981,86 +10035,6 @@
     <p:extLst>
       <p:ext uri="{BB962C8B-B14F-4D97-AF65-F5344CB8AC3E}">
         <p14:creationId xmlns:p14="http://schemas.microsoft.com/office/powerpoint/2010/main" val="2990119941"/>
-      </p:ext>
-    </p:extLst>
-  </p:cSld>
-  <p:clrMapOvr>
-    <a:masterClrMapping/>
-  </p:clrMapOvr>
-</p:sld>
-</file>
-
-<file path=ppt/slides/slide36.xml><?xml version="1.0" encoding="utf-8"?>
-<p:sld xmlns:a="http://schemas.openxmlformats.org/drawingml/2006/main" xmlns:r="http://schemas.openxmlformats.org/officeDocument/2006/relationships" xmlns:p="http://schemas.openxmlformats.org/presentationml/2006/main">
-  <p:cSld>
-    <p:spTree>
-      <p:nvGrpSpPr>
-        <p:cNvPr id="1" name=""/>
-        <p:cNvGrpSpPr/>
-        <p:nvPr/>
-      </p:nvGrpSpPr>
-      <p:grpSpPr>
-        <a:xfrm>
-          <a:off x="0" y="0"/>
-          <a:ext cx="0" cy="0"/>
-          <a:chOff x="0" y="0"/>
-          <a:chExt cx="0" cy="0"/>
-        </a:xfrm>
-      </p:grpSpPr>
-      <p:sp>
-        <p:nvSpPr>
-          <p:cNvPr id="2" name="Titolo 1">
-            <a:extLst>
-              <a:ext uri="{FF2B5EF4-FFF2-40B4-BE49-F238E27FC236}">
-                <a16:creationId xmlns:a16="http://schemas.microsoft.com/office/drawing/2014/main" id="{DE789CEA-F290-404A-BE19-A05C5BFD6FB1}"/>
-              </a:ext>
-            </a:extLst>
-          </p:cNvPr>
-          <p:cNvSpPr>
-            <a:spLocks noGrp="1"/>
-          </p:cNvSpPr>
-          <p:nvPr>
-            <p:ph type="title"/>
-          </p:nvPr>
-        </p:nvSpPr>
-        <p:spPr/>
-        <p:txBody>
-          <a:bodyPr/>
-          <a:lstStyle/>
-          <a:p>
-            <a:endParaRPr lang="it-IT"/>
-          </a:p>
-        </p:txBody>
-      </p:sp>
-      <p:sp>
-        <p:nvSpPr>
-          <p:cNvPr id="3" name="Segnaposto contenuto 2">
-            <a:extLst>
-              <a:ext uri="{FF2B5EF4-FFF2-40B4-BE49-F238E27FC236}">
-                <a16:creationId xmlns:a16="http://schemas.microsoft.com/office/drawing/2014/main" id="{64163237-47FE-4B14-BF94-DC54F844AB5A}"/>
-              </a:ext>
-            </a:extLst>
-          </p:cNvPr>
-          <p:cNvSpPr>
-            <a:spLocks noGrp="1"/>
-          </p:cNvSpPr>
-          <p:nvPr>
-            <p:ph idx="1"/>
-          </p:nvPr>
-        </p:nvSpPr>
-        <p:spPr/>
-        <p:txBody>
-          <a:bodyPr/>
-          <a:lstStyle/>
-          <a:p>
-            <a:endParaRPr lang="it-IT"/>
-          </a:p>
-        </p:txBody>
-      </p:sp>
-    </p:spTree>
-    <p:extLst>
-      <p:ext uri="{BB962C8B-B14F-4D97-AF65-F5344CB8AC3E}">
-        <p14:creationId xmlns:p14="http://schemas.microsoft.com/office/powerpoint/2010/main" val="1526653117"/>
       </p:ext>
     </p:extLst>
   </p:cSld>

</xml_diff>